<commit_message>
tarbajando en la VISUALIZACION
</commit_message>
<xml_diff>
--- a/Appendices/SD_007.pptx
+++ b/Appendices/SD_007.pptx
@@ -288,7 +288,7 @@
           <a:p>
             <a:fld id="{552D1098-5542-4C00-80F8-968512A25559}" type="datetimeFigureOut">
               <a:rPr lang="es-ES" smtClean="0"/>
-              <a:t>01/01/2016</a:t>
+              <a:t>03/05/2016</a:t>
             </a:fld>
             <a:endParaRPr lang="es-ES"/>
           </a:p>
@@ -458,7 +458,7 @@
           <a:p>
             <a:fld id="{552D1098-5542-4C00-80F8-968512A25559}" type="datetimeFigureOut">
               <a:rPr lang="es-ES" smtClean="0"/>
-              <a:t>01/01/2016</a:t>
+              <a:t>03/05/2016</a:t>
             </a:fld>
             <a:endParaRPr lang="es-ES"/>
           </a:p>
@@ -638,7 +638,7 @@
           <a:p>
             <a:fld id="{552D1098-5542-4C00-80F8-968512A25559}" type="datetimeFigureOut">
               <a:rPr lang="es-ES" smtClean="0"/>
-              <a:t>01/01/2016</a:t>
+              <a:t>03/05/2016</a:t>
             </a:fld>
             <a:endParaRPr lang="es-ES"/>
           </a:p>
@@ -808,7 +808,7 @@
           <a:p>
             <a:fld id="{552D1098-5542-4C00-80F8-968512A25559}" type="datetimeFigureOut">
               <a:rPr lang="es-ES" smtClean="0"/>
-              <a:t>01/01/2016</a:t>
+              <a:t>03/05/2016</a:t>
             </a:fld>
             <a:endParaRPr lang="es-ES"/>
           </a:p>
@@ -1054,7 +1054,7 @@
           <a:p>
             <a:fld id="{552D1098-5542-4C00-80F8-968512A25559}" type="datetimeFigureOut">
               <a:rPr lang="es-ES" smtClean="0"/>
-              <a:t>01/01/2016</a:t>
+              <a:t>03/05/2016</a:t>
             </a:fld>
             <a:endParaRPr lang="es-ES"/>
           </a:p>
@@ -1342,7 +1342,7 @@
           <a:p>
             <a:fld id="{552D1098-5542-4C00-80F8-968512A25559}" type="datetimeFigureOut">
               <a:rPr lang="es-ES" smtClean="0"/>
-              <a:t>01/01/2016</a:t>
+              <a:t>03/05/2016</a:t>
             </a:fld>
             <a:endParaRPr lang="es-ES"/>
           </a:p>
@@ -1769,7 +1769,7 @@
           <a:p>
             <a:fld id="{552D1098-5542-4C00-80F8-968512A25559}" type="datetimeFigureOut">
               <a:rPr lang="es-ES" smtClean="0"/>
-              <a:t>01/01/2016</a:t>
+              <a:t>03/05/2016</a:t>
             </a:fld>
             <a:endParaRPr lang="es-ES"/>
           </a:p>
@@ -1887,7 +1887,7 @@
           <a:p>
             <a:fld id="{552D1098-5542-4C00-80F8-968512A25559}" type="datetimeFigureOut">
               <a:rPr lang="es-ES" smtClean="0"/>
-              <a:t>01/01/2016</a:t>
+              <a:t>03/05/2016</a:t>
             </a:fld>
             <a:endParaRPr lang="es-ES"/>
           </a:p>
@@ -1982,7 +1982,7 @@
           <a:p>
             <a:fld id="{552D1098-5542-4C00-80F8-968512A25559}" type="datetimeFigureOut">
               <a:rPr lang="es-ES" smtClean="0"/>
-              <a:t>01/01/2016</a:t>
+              <a:t>03/05/2016</a:t>
             </a:fld>
             <a:endParaRPr lang="es-ES"/>
           </a:p>
@@ -2259,7 +2259,7 @@
           <a:p>
             <a:fld id="{552D1098-5542-4C00-80F8-968512A25559}" type="datetimeFigureOut">
               <a:rPr lang="es-ES" smtClean="0"/>
-              <a:t>01/01/2016</a:t>
+              <a:t>03/05/2016</a:t>
             </a:fld>
             <a:endParaRPr lang="es-ES"/>
           </a:p>
@@ -2512,7 +2512,7 @@
           <a:p>
             <a:fld id="{552D1098-5542-4C00-80F8-968512A25559}" type="datetimeFigureOut">
               <a:rPr lang="es-ES" smtClean="0"/>
-              <a:t>01/01/2016</a:t>
+              <a:t>03/05/2016</a:t>
             </a:fld>
             <a:endParaRPr lang="es-ES"/>
           </a:p>
@@ -2725,7 +2725,7 @@
           <a:p>
             <a:fld id="{552D1098-5542-4C00-80F8-968512A25559}" type="datetimeFigureOut">
               <a:rPr lang="es-ES" smtClean="0"/>
-              <a:t>01/01/2016</a:t>
+              <a:t>03/05/2016</a:t>
             </a:fld>
             <a:endParaRPr lang="es-ES"/>
           </a:p>
@@ -3220,7 +3220,7 @@
       </p:pic>
       <p:pic>
         <p:nvPicPr>
-          <p:cNvPr id="1033" name="Picture 9"/>
+          <p:cNvPr id="1027" name="Picture 3"/>
           <p:cNvPicPr>
             <a:picLocks noChangeAspect="1" noChangeArrowheads="1"/>
           </p:cNvPicPr>
@@ -3228,16 +3228,6 @@
         </p:nvPicPr>
         <p:blipFill>
           <a:blip r:embed="rId4" cstate="print">
-            <a:clrChange>
-              <a:clrFrom>
-                <a:srgbClr val="FFFFFF"/>
-              </a:clrFrom>
-              <a:clrTo>
-                <a:srgbClr val="FFFFFF">
-                  <a:alpha val="0"/>
-                </a:srgbClr>
-              </a:clrTo>
-            </a:clrChange>
             <a:extLst>
               <a:ext uri="{28A0092B-C50C-407E-A947-70E740481C1C}">
                 <a14:useLocalDpi xmlns:a14="http://schemas.microsoft.com/office/drawing/2010/main" val="0"/>
@@ -3251,8 +3241,8 @@
         </p:blipFill>
         <p:spPr bwMode="auto">
           <a:xfrm>
-            <a:off x="0" y="1975140"/>
-            <a:ext cx="3465715" cy="2711429"/>
+            <a:off x="260648" y="1948732"/>
+            <a:ext cx="3659667" cy="2540943"/>
           </a:xfrm>
           <a:prstGeom prst="rect">
             <a:avLst/>
@@ -3282,72 +3272,6 @@
           </a:extLst>
         </p:spPr>
       </p:pic>
-      <p:cxnSp>
-        <p:nvCxnSpPr>
-          <p:cNvPr id="5" name="4 Conector recto de flecha"/>
-          <p:cNvCxnSpPr/>
-          <p:nvPr/>
-        </p:nvCxnSpPr>
-        <p:spPr>
-          <a:xfrm flipH="1">
-            <a:off x="3356992" y="1691680"/>
-            <a:ext cx="432048" cy="648072"/>
-          </a:xfrm>
-          <a:prstGeom prst="straightConnector1">
-            <a:avLst/>
-          </a:prstGeom>
-          <a:ln>
-            <a:tailEnd type="arrow"/>
-          </a:ln>
-        </p:spPr>
-        <p:style>
-          <a:lnRef idx="1">
-            <a:schemeClr val="accent1"/>
-          </a:lnRef>
-          <a:fillRef idx="0">
-            <a:schemeClr val="accent1"/>
-          </a:fillRef>
-          <a:effectRef idx="0">
-            <a:schemeClr val="accent1"/>
-          </a:effectRef>
-          <a:fontRef idx="minor">
-            <a:schemeClr val="tx1"/>
-          </a:fontRef>
-        </p:style>
-      </p:cxnSp>
-      <p:cxnSp>
-        <p:nvCxnSpPr>
-          <p:cNvPr id="9" name="8 Conector recto de flecha"/>
-          <p:cNvCxnSpPr/>
-          <p:nvPr/>
-        </p:nvCxnSpPr>
-        <p:spPr>
-          <a:xfrm flipV="1">
-            <a:off x="2564904" y="3968536"/>
-            <a:ext cx="288032" cy="1323544"/>
-          </a:xfrm>
-          <a:prstGeom prst="straightConnector1">
-            <a:avLst/>
-          </a:prstGeom>
-          <a:ln>
-            <a:tailEnd type="arrow"/>
-          </a:ln>
-        </p:spPr>
-        <p:style>
-          <a:lnRef idx="1">
-            <a:schemeClr val="accent1"/>
-          </a:lnRef>
-          <a:fillRef idx="0">
-            <a:schemeClr val="accent1"/>
-          </a:fillRef>
-          <a:effectRef idx="0">
-            <a:schemeClr val="accent1"/>
-          </a:effectRef>
-          <a:fontRef idx="minor">
-            <a:schemeClr val="tx1"/>
-          </a:fontRef>
-        </p:style>
-      </p:cxnSp>
     </p:spTree>
     <p:extLst>
       <p:ext uri="{BB962C8B-B14F-4D97-AF65-F5344CB8AC3E}">

</xml_diff>